<commit_message>
updated slides and blast output for 2020
</commit_message>
<xml_diff>
--- a/slides.pptx
+++ b/slides.pptx
@@ -5,7 +5,7 @@
     <p:sldMasterId id="2147483660" r:id="rId1"/>
   </p:sldMasterIdLst>
   <p:notesMasterIdLst>
-    <p:notesMasterId r:id="rId8"/>
+    <p:notesMasterId r:id="rId9"/>
   </p:notesMasterIdLst>
   <p:sldIdLst>
     <p:sldId id="256" r:id="rId2"/>
@@ -14,6 +14,7 @@
     <p:sldId id="259" r:id="rId5"/>
     <p:sldId id="260" r:id="rId6"/>
     <p:sldId id="261" r:id="rId7"/>
+    <p:sldId id="262" r:id="rId8"/>
   </p:sldIdLst>
   <p:sldSz cx="12192000" cy="6858000"/>
   <p:notesSz cx="6858000" cy="9144000"/>
@@ -1875,7 +1876,7 @@
       </dgm:t>
     </dgm:pt>
     <dgm:pt modelId="{051C0A5A-2562-407A-BC2D-9C0A924B765E}">
-      <dgm:prSet/>
+      <dgm:prSet custT="1"/>
       <dgm:spPr>
         <a:gradFill flip="none" rotWithShape="1">
           <a:gsLst>
@@ -1904,15 +1905,15 @@
         <a:lstStyle/>
         <a:p>
           <a:r>
-            <a:rPr lang="en-US" dirty="0"/>
+            <a:rPr lang="en-US" sz="1800" dirty="0"/>
             <a:t>Sort sequences into gene families (</a:t>
           </a:r>
           <a:r>
-            <a:rPr lang="en-US" dirty="0" err="1"/>
+            <a:rPr lang="en-US" sz="1800" dirty="0" err="1"/>
             <a:t>Orthofinder</a:t>
           </a:r>
           <a:r>
-            <a:rPr lang="en-US" dirty="0"/>
+            <a:rPr lang="en-US" sz="1800" dirty="0"/>
             <a:t> or BLAST with Biopython)</a:t>
           </a:r>
         </a:p>
@@ -1941,7 +1942,7 @@
       </dgm:t>
     </dgm:pt>
     <dgm:pt modelId="{36C8EBF9-8D31-45DA-B706-671D2DCE18DD}">
-      <dgm:prSet/>
+      <dgm:prSet custT="1"/>
       <dgm:spPr>
         <a:solidFill>
           <a:schemeClr val="accent2"/>
@@ -1952,15 +1953,15 @@
         <a:lstStyle/>
         <a:p>
           <a:r>
-            <a:rPr lang="en-US" dirty="0"/>
+            <a:rPr lang="en-US" sz="1800" dirty="0"/>
             <a:t>Create </a:t>
           </a:r>
           <a:r>
-            <a:rPr lang="en-US" dirty="0" err="1"/>
+            <a:rPr lang="en-US" sz="1800" dirty="0" err="1"/>
             <a:t>fasta</a:t>
           </a:r>
           <a:r>
-            <a:rPr lang="en-US" dirty="0"/>
+            <a:rPr lang="en-US" sz="1800" dirty="0"/>
             <a:t> file for each gene family (Biopython)</a:t>
           </a:r>
         </a:p>
@@ -1989,7 +1990,7 @@
       </dgm:t>
     </dgm:pt>
     <dgm:pt modelId="{25AF7308-1824-4EBB-BAD7-2EC9128CE742}">
-      <dgm:prSet/>
+      <dgm:prSet custT="1"/>
       <dgm:spPr>
         <a:solidFill>
           <a:schemeClr val="accent2"/>
@@ -2000,7 +2001,7 @@
         <a:lstStyle/>
         <a:p>
           <a:r>
-            <a:rPr lang="en-US" dirty="0"/>
+            <a:rPr lang="en-US" sz="1800" dirty="0"/>
             <a:t>Rename sequences with sample id (Biopython)</a:t>
           </a:r>
         </a:p>
@@ -2029,7 +2030,7 @@
       </dgm:t>
     </dgm:pt>
     <dgm:pt modelId="{14E5CDCD-4A62-4FA2-892E-DEB24D58A4E9}">
-      <dgm:prSet/>
+      <dgm:prSet custT="1"/>
       <dgm:spPr>
         <a:solidFill>
           <a:schemeClr val="accent2"/>
@@ -2040,7 +2041,7 @@
         <a:lstStyle/>
         <a:p>
           <a:r>
-            <a:rPr lang="en-US"/>
+            <a:rPr lang="en-US" sz="1800" dirty="0"/>
             <a:t>Remove short sequences (Biopython)</a:t>
           </a:r>
         </a:p>
@@ -2069,7 +2070,7 @@
       </dgm:t>
     </dgm:pt>
     <dgm:pt modelId="{F20E292A-B9ED-47FF-B530-990672B47B85}">
-      <dgm:prSet/>
+      <dgm:prSet custT="1"/>
       <dgm:spPr>
         <a:solidFill>
           <a:schemeClr val="accent3"/>
@@ -2080,8 +2081,16 @@
         <a:lstStyle/>
         <a:p>
           <a:r>
-            <a:rPr lang="en-US"/>
-            <a:t>Align genes (Mafft)</a:t>
+            <a:rPr lang="en-US" sz="1800" dirty="0"/>
+            <a:t>Align genes (</a:t>
+          </a:r>
+          <a:r>
+            <a:rPr lang="en-US" sz="1800" dirty="0" err="1"/>
+            <a:t>Mafft</a:t>
+          </a:r>
+          <a:r>
+            <a:rPr lang="en-US" sz="1800" dirty="0"/>
+            <a:t>)</a:t>
           </a:r>
         </a:p>
       </dgm:t>
@@ -2109,7 +2118,7 @@
       </dgm:t>
     </dgm:pt>
     <dgm:pt modelId="{E0F7FFF3-D828-4611-8435-54A05A16A198}">
-      <dgm:prSet/>
+      <dgm:prSet custT="1"/>
       <dgm:spPr>
         <a:solidFill>
           <a:schemeClr val="accent5">
@@ -2123,8 +2132,16 @@
         <a:lstStyle/>
         <a:p>
           <a:r>
-            <a:rPr lang="en-US"/>
-            <a:t>Trim sequences (TrimAl)</a:t>
+            <a:rPr lang="en-US" sz="1800" dirty="0"/>
+            <a:t>Trim sequences (</a:t>
+          </a:r>
+          <a:r>
+            <a:rPr lang="en-US" sz="1800" dirty="0" err="1"/>
+            <a:t>TrimAl</a:t>
+          </a:r>
+          <a:r>
+            <a:rPr lang="en-US" sz="1800" dirty="0"/>
+            <a:t>)</a:t>
           </a:r>
         </a:p>
       </dgm:t>
@@ -2152,7 +2169,7 @@
       </dgm:t>
     </dgm:pt>
     <dgm:pt modelId="{5CF29EB2-C54F-4F09-8C33-A9075C35C566}">
-      <dgm:prSet/>
+      <dgm:prSet custT="1"/>
       <dgm:spPr>
         <a:solidFill>
           <a:schemeClr val="accent2"/>
@@ -2163,15 +2180,15 @@
         <a:lstStyle/>
         <a:p>
           <a:r>
-            <a:rPr lang="en-US" dirty="0"/>
+            <a:rPr lang="en-US" sz="1800" dirty="0"/>
             <a:t>Convert file to </a:t>
           </a:r>
           <a:r>
-            <a:rPr lang="en-US" dirty="0" err="1"/>
+            <a:rPr lang="en-US" sz="1800" dirty="0" err="1"/>
             <a:t>phylip</a:t>
           </a:r>
           <a:r>
-            <a:rPr lang="en-US" dirty="0"/>
+            <a:rPr lang="en-US" sz="1800" dirty="0"/>
             <a:t> format (Biopython)</a:t>
           </a:r>
         </a:p>
@@ -2200,15 +2217,23 @@
       </dgm:t>
     </dgm:pt>
     <dgm:pt modelId="{3C58C067-484F-4042-B723-F37357F9752D}">
-      <dgm:prSet/>
+      <dgm:prSet custT="1"/>
       <dgm:spPr/>
       <dgm:t>
         <a:bodyPr/>
         <a:lstStyle/>
         <a:p>
           <a:r>
-            <a:rPr lang="en-US"/>
-            <a:t>Make gene trees (RaxML)</a:t>
+            <a:rPr lang="en-US" sz="1800" dirty="0"/>
+            <a:t>Make gene trees (</a:t>
+          </a:r>
+          <a:r>
+            <a:rPr lang="en-US" sz="1800" dirty="0" err="1"/>
+            <a:t>RaxML</a:t>
+          </a:r>
+          <a:r>
+            <a:rPr lang="en-US" sz="1800" dirty="0"/>
+            <a:t>)</a:t>
           </a:r>
         </a:p>
       </dgm:t>
@@ -2236,14 +2261,14 @@
       </dgm:t>
     </dgm:pt>
     <dgm:pt modelId="{8B70B6C7-EA2B-44A5-956F-5816957F85C6}">
-      <dgm:prSet/>
+      <dgm:prSet custT="1"/>
       <dgm:spPr/>
       <dgm:t>
         <a:bodyPr/>
         <a:lstStyle/>
         <a:p>
           <a:r>
-            <a:rPr lang="en-US"/>
+            <a:rPr lang="en-US" sz="1800" dirty="0"/>
             <a:t>Build phylogenetic tree (Astral)</a:t>
           </a:r>
         </a:p>
@@ -2286,7 +2311,7 @@
       <dgm:spPr/>
     </dgm:pt>
     <dgm:pt modelId="{85247501-5A75-2442-9C49-73B10FA5F871}" type="pres">
-      <dgm:prSet presAssocID="{051C0A5A-2562-407A-BC2D-9C0A924B765E}" presName="parentText" presStyleLbl="node1" presStyleIdx="0" presStyleCnt="9">
+      <dgm:prSet presAssocID="{051C0A5A-2562-407A-BC2D-9C0A924B765E}" presName="parentText" presStyleLbl="node1" presStyleIdx="0" presStyleCnt="9" custScaleX="229973">
         <dgm:presLayoutVars>
           <dgm:chMax val="1"/>
           <dgm:bulletEnabled val="1"/>
@@ -2303,7 +2328,7 @@
       <dgm:spPr/>
     </dgm:pt>
     <dgm:pt modelId="{603EB0BB-CD18-3C4F-B005-37270776BE0E}" type="pres">
-      <dgm:prSet presAssocID="{36C8EBF9-8D31-45DA-B706-671D2DCE18DD}" presName="parentText" presStyleLbl="node1" presStyleIdx="1" presStyleCnt="9">
+      <dgm:prSet presAssocID="{36C8EBF9-8D31-45DA-B706-671D2DCE18DD}" presName="parentText" presStyleLbl="node1" presStyleIdx="1" presStyleCnt="9" custScaleX="229973">
         <dgm:presLayoutVars>
           <dgm:chMax val="1"/>
           <dgm:bulletEnabled val="1"/>
@@ -2320,7 +2345,7 @@
       <dgm:spPr/>
     </dgm:pt>
     <dgm:pt modelId="{D2752D65-2484-F149-93D4-EAC0A60CEC46}" type="pres">
-      <dgm:prSet presAssocID="{25AF7308-1824-4EBB-BAD7-2EC9128CE742}" presName="parentText" presStyleLbl="node1" presStyleIdx="2" presStyleCnt="9">
+      <dgm:prSet presAssocID="{25AF7308-1824-4EBB-BAD7-2EC9128CE742}" presName="parentText" presStyleLbl="node1" presStyleIdx="2" presStyleCnt="9" custScaleX="229973">
         <dgm:presLayoutVars>
           <dgm:chMax val="1"/>
           <dgm:bulletEnabled val="1"/>
@@ -2337,7 +2362,7 @@
       <dgm:spPr/>
     </dgm:pt>
     <dgm:pt modelId="{3D0D6CDA-FA13-9240-A285-F5610C3800FB}" type="pres">
-      <dgm:prSet presAssocID="{14E5CDCD-4A62-4FA2-892E-DEB24D58A4E9}" presName="parentText" presStyleLbl="node1" presStyleIdx="3" presStyleCnt="9">
+      <dgm:prSet presAssocID="{14E5CDCD-4A62-4FA2-892E-DEB24D58A4E9}" presName="parentText" presStyleLbl="node1" presStyleIdx="3" presStyleCnt="9" custScaleX="229973">
         <dgm:presLayoutVars>
           <dgm:chMax val="1"/>
           <dgm:bulletEnabled val="1"/>
@@ -2354,7 +2379,7 @@
       <dgm:spPr/>
     </dgm:pt>
     <dgm:pt modelId="{D1EECEC6-0882-014F-BED2-27A9F5599520}" type="pres">
-      <dgm:prSet presAssocID="{F20E292A-B9ED-47FF-B530-990672B47B85}" presName="parentText" presStyleLbl="node1" presStyleIdx="4" presStyleCnt="9">
+      <dgm:prSet presAssocID="{F20E292A-B9ED-47FF-B530-990672B47B85}" presName="parentText" presStyleLbl="node1" presStyleIdx="4" presStyleCnt="9" custScaleX="229973">
         <dgm:presLayoutVars>
           <dgm:chMax val="1"/>
           <dgm:bulletEnabled val="1"/>
@@ -2371,7 +2396,7 @@
       <dgm:spPr/>
     </dgm:pt>
     <dgm:pt modelId="{0D9FA9F7-7451-E549-BBFB-040263943A2B}" type="pres">
-      <dgm:prSet presAssocID="{E0F7FFF3-D828-4611-8435-54A05A16A198}" presName="parentText" presStyleLbl="node1" presStyleIdx="5" presStyleCnt="9">
+      <dgm:prSet presAssocID="{E0F7FFF3-D828-4611-8435-54A05A16A198}" presName="parentText" presStyleLbl="node1" presStyleIdx="5" presStyleCnt="9" custScaleX="229973">
         <dgm:presLayoutVars>
           <dgm:chMax val="1"/>
           <dgm:bulletEnabled val="1"/>
@@ -2388,7 +2413,7 @@
       <dgm:spPr/>
     </dgm:pt>
     <dgm:pt modelId="{6B01D4FF-F292-9C4A-8490-78A256F5E655}" type="pres">
-      <dgm:prSet presAssocID="{5CF29EB2-C54F-4F09-8C33-A9075C35C566}" presName="parentText" presStyleLbl="node1" presStyleIdx="6" presStyleCnt="9">
+      <dgm:prSet presAssocID="{5CF29EB2-C54F-4F09-8C33-A9075C35C566}" presName="parentText" presStyleLbl="node1" presStyleIdx="6" presStyleCnt="9" custScaleX="229973">
         <dgm:presLayoutVars>
           <dgm:chMax val="1"/>
           <dgm:bulletEnabled val="1"/>
@@ -2405,7 +2430,7 @@
       <dgm:spPr/>
     </dgm:pt>
     <dgm:pt modelId="{C7EB203A-1508-DE41-8744-CD183F7C9A22}" type="pres">
-      <dgm:prSet presAssocID="{3C58C067-484F-4042-B723-F37357F9752D}" presName="parentText" presStyleLbl="node1" presStyleIdx="7" presStyleCnt="9">
+      <dgm:prSet presAssocID="{3C58C067-484F-4042-B723-F37357F9752D}" presName="parentText" presStyleLbl="node1" presStyleIdx="7" presStyleCnt="9" custScaleX="229973">
         <dgm:presLayoutVars>
           <dgm:chMax val="1"/>
           <dgm:bulletEnabled val="1"/>
@@ -2422,7 +2447,7 @@
       <dgm:spPr/>
     </dgm:pt>
     <dgm:pt modelId="{206CDCBB-E4AD-C140-B19D-5F69898F23EB}" type="pres">
-      <dgm:prSet presAssocID="{8B70B6C7-EA2B-44A5-956F-5816957F85C6}" presName="parentText" presStyleLbl="node1" presStyleIdx="8" presStyleCnt="9">
+      <dgm:prSet presAssocID="{8B70B6C7-EA2B-44A5-956F-5816957F85C6}" presName="parentText" presStyleLbl="node1" presStyleIdx="8" presStyleCnt="9" custScaleX="229973">
         <dgm:presLayoutVars>
           <dgm:chMax val="1"/>
           <dgm:bulletEnabled val="1"/>
@@ -2515,8 +2540,8 @@
       </dsp:nvSpPr>
       <dsp:spPr>
         <a:xfrm>
-          <a:off x="3077802" y="1149"/>
-          <a:ext cx="3462527" cy="435232"/>
+          <a:off x="827626" y="1339"/>
+          <a:ext cx="7962879" cy="507377"/>
         </a:xfrm>
         <a:prstGeom prst="roundRect">
           <a:avLst/>
@@ -2570,12 +2595,12 @@
         </a:fontRef>
       </dsp:style>
       <dsp:txBody>
-        <a:bodyPr spcFirstLastPara="0" vert="horz" wrap="square" lIns="45720" tIns="22860" rIns="45720" bIns="22860" numCol="1" spcCol="1270" anchor="ctr" anchorCtr="0">
+        <a:bodyPr spcFirstLastPara="0" vert="horz" wrap="square" lIns="68580" tIns="34290" rIns="68580" bIns="34290" numCol="1" spcCol="1270" anchor="ctr" anchorCtr="0">
           <a:noAutofit/>
         </a:bodyPr>
         <a:lstStyle/>
         <a:p>
-          <a:pPr marL="0" lvl="0" indent="0" algn="ctr" defTabSz="533400">
+          <a:pPr marL="0" lvl="0" indent="0" algn="ctr" defTabSz="800100">
             <a:lnSpc>
               <a:spcPct val="90000"/>
             </a:lnSpc>
@@ -2588,22 +2613,22 @@
             <a:buNone/>
           </a:pPr>
           <a:r>
-            <a:rPr lang="en-US" sz="1200" kern="1200" dirty="0"/>
+            <a:rPr lang="en-US" sz="1800" kern="1200" dirty="0"/>
             <a:t>Sort sequences into gene families (</a:t>
           </a:r>
           <a:r>
-            <a:rPr lang="en-US" sz="1200" kern="1200" dirty="0" err="1"/>
+            <a:rPr lang="en-US" sz="1800" kern="1200" dirty="0" err="1"/>
             <a:t>Orthofinder</a:t>
           </a:r>
           <a:r>
-            <a:rPr lang="en-US" sz="1200" kern="1200" dirty="0"/>
+            <a:rPr lang="en-US" sz="1800" kern="1200" dirty="0"/>
             <a:t> or BLAST with Biopython)</a:t>
           </a:r>
         </a:p>
       </dsp:txBody>
       <dsp:txXfrm>
-        <a:off x="3099048" y="22395"/>
-        <a:ext cx="3420035" cy="392740"/>
+        <a:off x="852394" y="26107"/>
+        <a:ext cx="7913343" cy="457841"/>
       </dsp:txXfrm>
     </dsp:sp>
     <dsp:sp modelId="{603EB0BB-CD18-3C4F-B005-37270776BE0E}">
@@ -2613,8 +2638,8 @@
       </dsp:nvSpPr>
       <dsp:spPr>
         <a:xfrm>
-          <a:off x="3077802" y="458143"/>
-          <a:ext cx="3462527" cy="435232"/>
+          <a:off x="827626" y="534085"/>
+          <a:ext cx="7962879" cy="507377"/>
         </a:xfrm>
         <a:prstGeom prst="roundRect">
           <a:avLst/>
@@ -2650,12 +2675,12 @@
         </a:fontRef>
       </dsp:style>
       <dsp:txBody>
-        <a:bodyPr spcFirstLastPara="0" vert="horz" wrap="square" lIns="45720" tIns="22860" rIns="45720" bIns="22860" numCol="1" spcCol="1270" anchor="ctr" anchorCtr="0">
+        <a:bodyPr spcFirstLastPara="0" vert="horz" wrap="square" lIns="68580" tIns="34290" rIns="68580" bIns="34290" numCol="1" spcCol="1270" anchor="ctr" anchorCtr="0">
           <a:noAutofit/>
         </a:bodyPr>
         <a:lstStyle/>
         <a:p>
-          <a:pPr marL="0" lvl="0" indent="0" algn="ctr" defTabSz="533400">
+          <a:pPr marL="0" lvl="0" indent="0" algn="ctr" defTabSz="800100">
             <a:lnSpc>
               <a:spcPct val="90000"/>
             </a:lnSpc>
@@ -2668,22 +2693,22 @@
             <a:buNone/>
           </a:pPr>
           <a:r>
-            <a:rPr lang="en-US" sz="1200" kern="1200" dirty="0"/>
+            <a:rPr lang="en-US" sz="1800" kern="1200" dirty="0"/>
             <a:t>Create </a:t>
           </a:r>
           <a:r>
-            <a:rPr lang="en-US" sz="1200" kern="1200" dirty="0" err="1"/>
+            <a:rPr lang="en-US" sz="1800" kern="1200" dirty="0" err="1"/>
             <a:t>fasta</a:t>
           </a:r>
           <a:r>
-            <a:rPr lang="en-US" sz="1200" kern="1200" dirty="0"/>
+            <a:rPr lang="en-US" sz="1800" kern="1200" dirty="0"/>
             <a:t> file for each gene family (Biopython)</a:t>
           </a:r>
         </a:p>
       </dsp:txBody>
       <dsp:txXfrm>
-        <a:off x="3099048" y="479389"/>
-        <a:ext cx="3420035" cy="392740"/>
+        <a:off x="852394" y="558853"/>
+        <a:ext cx="7913343" cy="457841"/>
       </dsp:txXfrm>
     </dsp:sp>
     <dsp:sp modelId="{D2752D65-2484-F149-93D4-EAC0A60CEC46}">
@@ -2693,8 +2718,8 @@
       </dsp:nvSpPr>
       <dsp:spPr>
         <a:xfrm>
-          <a:off x="3077802" y="915137"/>
-          <a:ext cx="3462527" cy="435232"/>
+          <a:off x="827626" y="1066831"/>
+          <a:ext cx="7962879" cy="507377"/>
         </a:xfrm>
         <a:prstGeom prst="roundRect">
           <a:avLst/>
@@ -2730,12 +2755,12 @@
         </a:fontRef>
       </dsp:style>
       <dsp:txBody>
-        <a:bodyPr spcFirstLastPara="0" vert="horz" wrap="square" lIns="45720" tIns="22860" rIns="45720" bIns="22860" numCol="1" spcCol="1270" anchor="ctr" anchorCtr="0">
+        <a:bodyPr spcFirstLastPara="0" vert="horz" wrap="square" lIns="68580" tIns="34290" rIns="68580" bIns="34290" numCol="1" spcCol="1270" anchor="ctr" anchorCtr="0">
           <a:noAutofit/>
         </a:bodyPr>
         <a:lstStyle/>
         <a:p>
-          <a:pPr marL="0" lvl="0" indent="0" algn="ctr" defTabSz="533400">
+          <a:pPr marL="0" lvl="0" indent="0" algn="ctr" defTabSz="800100">
             <a:lnSpc>
               <a:spcPct val="90000"/>
             </a:lnSpc>
@@ -2748,14 +2773,14 @@
             <a:buNone/>
           </a:pPr>
           <a:r>
-            <a:rPr lang="en-US" sz="1200" kern="1200" dirty="0"/>
+            <a:rPr lang="en-US" sz="1800" kern="1200" dirty="0"/>
             <a:t>Rename sequences with sample id (Biopython)</a:t>
           </a:r>
         </a:p>
       </dsp:txBody>
       <dsp:txXfrm>
-        <a:off x="3099048" y="936383"/>
-        <a:ext cx="3420035" cy="392740"/>
+        <a:off x="852394" y="1091599"/>
+        <a:ext cx="7913343" cy="457841"/>
       </dsp:txXfrm>
     </dsp:sp>
     <dsp:sp modelId="{3D0D6CDA-FA13-9240-A285-F5610C3800FB}">
@@ -2765,8 +2790,8 @@
       </dsp:nvSpPr>
       <dsp:spPr>
         <a:xfrm>
-          <a:off x="3077802" y="1372130"/>
-          <a:ext cx="3462527" cy="435232"/>
+          <a:off x="827626" y="1599577"/>
+          <a:ext cx="7962879" cy="507377"/>
         </a:xfrm>
         <a:prstGeom prst="roundRect">
           <a:avLst/>
@@ -2802,12 +2827,12 @@
         </a:fontRef>
       </dsp:style>
       <dsp:txBody>
-        <a:bodyPr spcFirstLastPara="0" vert="horz" wrap="square" lIns="45720" tIns="22860" rIns="45720" bIns="22860" numCol="1" spcCol="1270" anchor="ctr" anchorCtr="0">
+        <a:bodyPr spcFirstLastPara="0" vert="horz" wrap="square" lIns="68580" tIns="34290" rIns="68580" bIns="34290" numCol="1" spcCol="1270" anchor="ctr" anchorCtr="0">
           <a:noAutofit/>
         </a:bodyPr>
         <a:lstStyle/>
         <a:p>
-          <a:pPr marL="0" lvl="0" indent="0" algn="ctr" defTabSz="533400">
+          <a:pPr marL="0" lvl="0" indent="0" algn="ctr" defTabSz="800100">
             <a:lnSpc>
               <a:spcPct val="90000"/>
             </a:lnSpc>
@@ -2820,14 +2845,14 @@
             <a:buNone/>
           </a:pPr>
           <a:r>
-            <a:rPr lang="en-US" sz="1200" kern="1200"/>
+            <a:rPr lang="en-US" sz="1800" kern="1200" dirty="0"/>
             <a:t>Remove short sequences (Biopython)</a:t>
           </a:r>
         </a:p>
       </dsp:txBody>
       <dsp:txXfrm>
-        <a:off x="3099048" y="1393376"/>
-        <a:ext cx="3420035" cy="392740"/>
+        <a:off x="852394" y="1624345"/>
+        <a:ext cx="7913343" cy="457841"/>
       </dsp:txXfrm>
     </dsp:sp>
     <dsp:sp modelId="{D1EECEC6-0882-014F-BED2-27A9F5599520}">
@@ -2837,8 +2862,8 @@
       </dsp:nvSpPr>
       <dsp:spPr>
         <a:xfrm>
-          <a:off x="3077802" y="1829124"/>
-          <a:ext cx="3462527" cy="435232"/>
+          <a:off x="827626" y="2132323"/>
+          <a:ext cx="7962879" cy="507377"/>
         </a:xfrm>
         <a:prstGeom prst="roundRect">
           <a:avLst/>
@@ -2874,12 +2899,12 @@
         </a:fontRef>
       </dsp:style>
       <dsp:txBody>
-        <a:bodyPr spcFirstLastPara="0" vert="horz" wrap="square" lIns="45720" tIns="22860" rIns="45720" bIns="22860" numCol="1" spcCol="1270" anchor="ctr" anchorCtr="0">
+        <a:bodyPr spcFirstLastPara="0" vert="horz" wrap="square" lIns="68580" tIns="34290" rIns="68580" bIns="34290" numCol="1" spcCol="1270" anchor="ctr" anchorCtr="0">
           <a:noAutofit/>
         </a:bodyPr>
         <a:lstStyle/>
         <a:p>
-          <a:pPr marL="0" lvl="0" indent="0" algn="ctr" defTabSz="533400">
+          <a:pPr marL="0" lvl="0" indent="0" algn="ctr" defTabSz="800100">
             <a:lnSpc>
               <a:spcPct val="90000"/>
             </a:lnSpc>
@@ -2892,14 +2917,22 @@
             <a:buNone/>
           </a:pPr>
           <a:r>
-            <a:rPr lang="en-US" sz="1200" kern="1200"/>
-            <a:t>Align genes (Mafft)</a:t>
+            <a:rPr lang="en-US" sz="1800" kern="1200" dirty="0"/>
+            <a:t>Align genes (</a:t>
+          </a:r>
+          <a:r>
+            <a:rPr lang="en-US" sz="1800" kern="1200" dirty="0" err="1"/>
+            <a:t>Mafft</a:t>
+          </a:r>
+          <a:r>
+            <a:rPr lang="en-US" sz="1800" kern="1200" dirty="0"/>
+            <a:t>)</a:t>
           </a:r>
         </a:p>
       </dsp:txBody>
       <dsp:txXfrm>
-        <a:off x="3099048" y="1850370"/>
-        <a:ext cx="3420035" cy="392740"/>
+        <a:off x="852394" y="2157091"/>
+        <a:ext cx="7913343" cy="457841"/>
       </dsp:txXfrm>
     </dsp:sp>
     <dsp:sp modelId="{0D9FA9F7-7451-E549-BBFB-040263943A2B}">
@@ -2909,8 +2942,8 @@
       </dsp:nvSpPr>
       <dsp:spPr>
         <a:xfrm>
-          <a:off x="3077802" y="2286118"/>
-          <a:ext cx="3462527" cy="435232"/>
+          <a:off x="827626" y="2665069"/>
+          <a:ext cx="7962879" cy="507377"/>
         </a:xfrm>
         <a:prstGeom prst="roundRect">
           <a:avLst/>
@@ -2949,12 +2982,12 @@
         </a:fontRef>
       </dsp:style>
       <dsp:txBody>
-        <a:bodyPr spcFirstLastPara="0" vert="horz" wrap="square" lIns="45720" tIns="22860" rIns="45720" bIns="22860" numCol="1" spcCol="1270" anchor="ctr" anchorCtr="0">
+        <a:bodyPr spcFirstLastPara="0" vert="horz" wrap="square" lIns="68580" tIns="34290" rIns="68580" bIns="34290" numCol="1" spcCol="1270" anchor="ctr" anchorCtr="0">
           <a:noAutofit/>
         </a:bodyPr>
         <a:lstStyle/>
         <a:p>
-          <a:pPr marL="0" lvl="0" indent="0" algn="ctr" defTabSz="533400">
+          <a:pPr marL="0" lvl="0" indent="0" algn="ctr" defTabSz="800100">
             <a:lnSpc>
               <a:spcPct val="90000"/>
             </a:lnSpc>
@@ -2967,14 +3000,22 @@
             <a:buNone/>
           </a:pPr>
           <a:r>
-            <a:rPr lang="en-US" sz="1200" kern="1200"/>
-            <a:t>Trim sequences (TrimAl)</a:t>
+            <a:rPr lang="en-US" sz="1800" kern="1200" dirty="0"/>
+            <a:t>Trim sequences (</a:t>
+          </a:r>
+          <a:r>
+            <a:rPr lang="en-US" sz="1800" kern="1200" dirty="0" err="1"/>
+            <a:t>TrimAl</a:t>
+          </a:r>
+          <a:r>
+            <a:rPr lang="en-US" sz="1800" kern="1200" dirty="0"/>
+            <a:t>)</a:t>
           </a:r>
         </a:p>
       </dsp:txBody>
       <dsp:txXfrm>
-        <a:off x="3099048" y="2307364"/>
-        <a:ext cx="3420035" cy="392740"/>
+        <a:off x="852394" y="2689837"/>
+        <a:ext cx="7913343" cy="457841"/>
       </dsp:txXfrm>
     </dsp:sp>
     <dsp:sp modelId="{6B01D4FF-F292-9C4A-8490-78A256F5E655}">
@@ -2984,8 +3025,8 @@
       </dsp:nvSpPr>
       <dsp:spPr>
         <a:xfrm>
-          <a:off x="3077802" y="2743112"/>
-          <a:ext cx="3462527" cy="435232"/>
+          <a:off x="827626" y="3197815"/>
+          <a:ext cx="7962879" cy="507377"/>
         </a:xfrm>
         <a:prstGeom prst="roundRect">
           <a:avLst/>
@@ -3021,12 +3062,12 @@
         </a:fontRef>
       </dsp:style>
       <dsp:txBody>
-        <a:bodyPr spcFirstLastPara="0" vert="horz" wrap="square" lIns="45720" tIns="22860" rIns="45720" bIns="22860" numCol="1" spcCol="1270" anchor="ctr" anchorCtr="0">
+        <a:bodyPr spcFirstLastPara="0" vert="horz" wrap="square" lIns="68580" tIns="34290" rIns="68580" bIns="34290" numCol="1" spcCol="1270" anchor="ctr" anchorCtr="0">
           <a:noAutofit/>
         </a:bodyPr>
         <a:lstStyle/>
         <a:p>
-          <a:pPr marL="0" lvl="0" indent="0" algn="ctr" defTabSz="533400">
+          <a:pPr marL="0" lvl="0" indent="0" algn="ctr" defTabSz="800100">
             <a:lnSpc>
               <a:spcPct val="90000"/>
             </a:lnSpc>
@@ -3039,22 +3080,22 @@
             <a:buNone/>
           </a:pPr>
           <a:r>
-            <a:rPr lang="en-US" sz="1200" kern="1200" dirty="0"/>
+            <a:rPr lang="en-US" sz="1800" kern="1200" dirty="0"/>
             <a:t>Convert file to </a:t>
           </a:r>
           <a:r>
-            <a:rPr lang="en-US" sz="1200" kern="1200" dirty="0" err="1"/>
+            <a:rPr lang="en-US" sz="1800" kern="1200" dirty="0" err="1"/>
             <a:t>phylip</a:t>
           </a:r>
           <a:r>
-            <a:rPr lang="en-US" sz="1200" kern="1200" dirty="0"/>
+            <a:rPr lang="en-US" sz="1800" kern="1200" dirty="0"/>
             <a:t> format (Biopython)</a:t>
           </a:r>
         </a:p>
       </dsp:txBody>
       <dsp:txXfrm>
-        <a:off x="3099048" y="2764358"/>
-        <a:ext cx="3420035" cy="392740"/>
+        <a:off x="852394" y="3222583"/>
+        <a:ext cx="7913343" cy="457841"/>
       </dsp:txXfrm>
     </dsp:sp>
     <dsp:sp modelId="{C7EB203A-1508-DE41-8744-CD183F7C9A22}">
@@ -3064,8 +3105,8 @@
       </dsp:nvSpPr>
       <dsp:spPr>
         <a:xfrm>
-          <a:off x="3077802" y="3200106"/>
-          <a:ext cx="3462527" cy="435232"/>
+          <a:off x="827626" y="3730561"/>
+          <a:ext cx="7962879" cy="507377"/>
         </a:xfrm>
         <a:prstGeom prst="roundRect">
           <a:avLst/>
@@ -3106,12 +3147,12 @@
         </a:fontRef>
       </dsp:style>
       <dsp:txBody>
-        <a:bodyPr spcFirstLastPara="0" vert="horz" wrap="square" lIns="45720" tIns="22860" rIns="45720" bIns="22860" numCol="1" spcCol="1270" anchor="ctr" anchorCtr="0">
+        <a:bodyPr spcFirstLastPara="0" vert="horz" wrap="square" lIns="68580" tIns="34290" rIns="68580" bIns="34290" numCol="1" spcCol="1270" anchor="ctr" anchorCtr="0">
           <a:noAutofit/>
         </a:bodyPr>
         <a:lstStyle/>
         <a:p>
-          <a:pPr marL="0" lvl="0" indent="0" algn="ctr" defTabSz="533400">
+          <a:pPr marL="0" lvl="0" indent="0" algn="ctr" defTabSz="800100">
             <a:lnSpc>
               <a:spcPct val="90000"/>
             </a:lnSpc>
@@ -3124,14 +3165,22 @@
             <a:buNone/>
           </a:pPr>
           <a:r>
-            <a:rPr lang="en-US" sz="1200" kern="1200"/>
-            <a:t>Make gene trees (RaxML)</a:t>
+            <a:rPr lang="en-US" sz="1800" kern="1200" dirty="0"/>
+            <a:t>Make gene trees (</a:t>
+          </a:r>
+          <a:r>
+            <a:rPr lang="en-US" sz="1800" kern="1200" dirty="0" err="1"/>
+            <a:t>RaxML</a:t>
+          </a:r>
+          <a:r>
+            <a:rPr lang="en-US" sz="1800" kern="1200" dirty="0"/>
+            <a:t>)</a:t>
           </a:r>
         </a:p>
       </dsp:txBody>
       <dsp:txXfrm>
-        <a:off x="3099048" y="3221352"/>
-        <a:ext cx="3420035" cy="392740"/>
+        <a:off x="852394" y="3755329"/>
+        <a:ext cx="7913343" cy="457841"/>
       </dsp:txXfrm>
     </dsp:sp>
     <dsp:sp modelId="{206CDCBB-E4AD-C140-B19D-5F69898F23EB}">
@@ -3141,8 +3190,8 @@
       </dsp:nvSpPr>
       <dsp:spPr>
         <a:xfrm>
-          <a:off x="3077802" y="3657100"/>
-          <a:ext cx="3462527" cy="435232"/>
+          <a:off x="827626" y="4263308"/>
+          <a:ext cx="7962879" cy="507377"/>
         </a:xfrm>
         <a:prstGeom prst="roundRect">
           <a:avLst/>
@@ -3183,12 +3232,12 @@
         </a:fontRef>
       </dsp:style>
       <dsp:txBody>
-        <a:bodyPr spcFirstLastPara="0" vert="horz" wrap="square" lIns="45720" tIns="22860" rIns="45720" bIns="22860" numCol="1" spcCol="1270" anchor="ctr" anchorCtr="0">
+        <a:bodyPr spcFirstLastPara="0" vert="horz" wrap="square" lIns="68580" tIns="34290" rIns="68580" bIns="34290" numCol="1" spcCol="1270" anchor="ctr" anchorCtr="0">
           <a:noAutofit/>
         </a:bodyPr>
         <a:lstStyle/>
         <a:p>
-          <a:pPr marL="0" lvl="0" indent="0" algn="ctr" defTabSz="533400">
+          <a:pPr marL="0" lvl="0" indent="0" algn="ctr" defTabSz="800100">
             <a:lnSpc>
               <a:spcPct val="90000"/>
             </a:lnSpc>
@@ -3201,14 +3250,14 @@
             <a:buNone/>
           </a:pPr>
           <a:r>
-            <a:rPr lang="en-US" sz="1200" kern="1200"/>
+            <a:rPr lang="en-US" sz="1800" kern="1200" dirty="0"/>
             <a:t>Build phylogenetic tree (Astral)</a:t>
           </a:r>
         </a:p>
       </dsp:txBody>
       <dsp:txXfrm>
-        <a:off x="3099048" y="3678346"/>
-        <a:ext cx="3420035" cy="392740"/>
+        <a:off x="852394" y="4288076"/>
+        <a:ext cx="7913343" cy="457841"/>
       </dsp:txXfrm>
     </dsp:sp>
   </dsp:spTree>
@@ -5807,7 +5856,7 @@
           <a:p>
             <a:fld id="{99BB2341-6242-BB46-87FA-4FF3C3F4291A}" type="datetimeFigureOut">
               <a:rPr lang="en-US" smtClean="0"/>
-              <a:t>11/30/19</a:t>
+              <a:t>8/12/20</a:t>
             </a:fld>
             <a:endParaRPr lang="en-US"/>
           </a:p>
@@ -6880,7 +6929,7 @@
           <a:p>
             <a:fld id="{AE078143-4932-D94F-9650-ED6DADE898C8}" type="datetimeFigureOut">
               <a:rPr lang="en-US" smtClean="0"/>
-              <a:t>11/30/19</a:t>
+              <a:t>8/12/20</a:t>
             </a:fld>
             <a:endParaRPr lang="en-US"/>
           </a:p>
@@ -7131,7 +7180,7 @@
           <a:p>
             <a:fld id="{AE078143-4932-D94F-9650-ED6DADE898C8}" type="datetimeFigureOut">
               <a:rPr lang="en-US" smtClean="0"/>
-              <a:t>11/30/19</a:t>
+              <a:t>8/12/20</a:t>
             </a:fld>
             <a:endParaRPr lang="en-US"/>
           </a:p>
@@ -7445,7 +7494,7 @@
           <a:p>
             <a:fld id="{AE078143-4932-D94F-9650-ED6DADE898C8}" type="datetimeFigureOut">
               <a:rPr lang="en-US" smtClean="0"/>
-              <a:t>11/30/19</a:t>
+              <a:t>8/12/20</a:t>
             </a:fld>
             <a:endParaRPr lang="en-US"/>
           </a:p>
@@ -7786,7 +7835,7 @@
           <a:p>
             <a:fld id="{AE078143-4932-D94F-9650-ED6DADE898C8}" type="datetimeFigureOut">
               <a:rPr lang="en-US" smtClean="0"/>
-              <a:t>11/30/19</a:t>
+              <a:t>8/12/20</a:t>
             </a:fld>
             <a:endParaRPr lang="en-US"/>
           </a:p>
@@ -8100,7 +8149,7 @@
           <a:p>
             <a:fld id="{AE078143-4932-D94F-9650-ED6DADE898C8}" type="datetimeFigureOut">
               <a:rPr lang="en-US" smtClean="0"/>
-              <a:t>11/30/19</a:t>
+              <a:t>8/12/20</a:t>
             </a:fld>
             <a:endParaRPr lang="en-US"/>
           </a:p>
@@ -8493,7 +8542,7 @@
           <a:p>
             <a:fld id="{AE078143-4932-D94F-9650-ED6DADE898C8}" type="datetimeFigureOut">
               <a:rPr lang="en-US" smtClean="0"/>
-              <a:t>11/30/19</a:t>
+              <a:t>8/12/20</a:t>
             </a:fld>
             <a:endParaRPr lang="en-US"/>
           </a:p>
@@ -8663,7 +8712,7 @@
           <a:p>
             <a:fld id="{AE078143-4932-D94F-9650-ED6DADE898C8}" type="datetimeFigureOut">
               <a:rPr lang="en-US" smtClean="0"/>
-              <a:t>11/30/19</a:t>
+              <a:t>8/12/20</a:t>
             </a:fld>
             <a:endParaRPr lang="en-US"/>
           </a:p>
@@ -8843,7 +8892,7 @@
           <a:p>
             <a:fld id="{AE078143-4932-D94F-9650-ED6DADE898C8}" type="datetimeFigureOut">
               <a:rPr lang="en-US" smtClean="0"/>
-              <a:t>11/30/19</a:t>
+              <a:t>8/12/20</a:t>
             </a:fld>
             <a:endParaRPr lang="en-US"/>
           </a:p>
@@ -9019,7 +9068,7 @@
           <a:p>
             <a:fld id="{AE078143-4932-D94F-9650-ED6DADE898C8}" type="datetimeFigureOut">
               <a:rPr lang="en-US" smtClean="0"/>
-              <a:t>11/30/19</a:t>
+              <a:t>8/12/20</a:t>
             </a:fld>
             <a:endParaRPr lang="en-US"/>
           </a:p>
@@ -9266,7 +9315,7 @@
           <a:p>
             <a:fld id="{AE078143-4932-D94F-9650-ED6DADE898C8}" type="datetimeFigureOut">
               <a:rPr lang="en-US" smtClean="0"/>
-              <a:t>11/30/19</a:t>
+              <a:t>8/12/20</a:t>
             </a:fld>
             <a:endParaRPr lang="en-US"/>
           </a:p>
@@ -9498,7 +9547,7 @@
           <a:p>
             <a:fld id="{AE078143-4932-D94F-9650-ED6DADE898C8}" type="datetimeFigureOut">
               <a:rPr lang="en-US" smtClean="0"/>
-              <a:t>11/30/19</a:t>
+              <a:t>8/12/20</a:t>
             </a:fld>
             <a:endParaRPr lang="en-US"/>
           </a:p>
@@ -9872,7 +9921,7 @@
           <a:p>
             <a:fld id="{AE078143-4932-D94F-9650-ED6DADE898C8}" type="datetimeFigureOut">
               <a:rPr lang="en-US" smtClean="0"/>
-              <a:t>11/30/19</a:t>
+              <a:t>8/12/20</a:t>
             </a:fld>
             <a:endParaRPr lang="en-US"/>
           </a:p>
@@ -9995,7 +10044,7 @@
           <a:p>
             <a:fld id="{AE078143-4932-D94F-9650-ED6DADE898C8}" type="datetimeFigureOut">
               <a:rPr lang="en-US" smtClean="0"/>
-              <a:t>11/30/19</a:t>
+              <a:t>8/12/20</a:t>
             </a:fld>
             <a:endParaRPr lang="en-US"/>
           </a:p>
@@ -10090,7 +10139,7 @@
           <a:p>
             <a:fld id="{AE078143-4932-D94F-9650-ED6DADE898C8}" type="datetimeFigureOut">
               <a:rPr lang="en-US" smtClean="0"/>
-              <a:t>11/30/19</a:t>
+              <a:t>8/12/20</a:t>
             </a:fld>
             <a:endParaRPr lang="en-US"/>
           </a:p>
@@ -10345,7 +10394,7 @@
           <a:p>
             <a:fld id="{AE078143-4932-D94F-9650-ED6DADE898C8}" type="datetimeFigureOut">
               <a:rPr lang="en-US" smtClean="0"/>
-              <a:t>11/30/19</a:t>
+              <a:t>8/12/20</a:t>
             </a:fld>
             <a:endParaRPr lang="en-US"/>
           </a:p>
@@ -10608,7 +10657,7 @@
           <a:p>
             <a:fld id="{AE078143-4932-D94F-9650-ED6DADE898C8}" type="datetimeFigureOut">
               <a:rPr lang="en-US" smtClean="0"/>
-              <a:t>11/30/19</a:t>
+              <a:t>8/12/20</a:t>
             </a:fld>
             <a:endParaRPr lang="en-US"/>
           </a:p>
@@ -11351,7 +11400,7 @@
           <a:p>
             <a:fld id="{AE078143-4932-D94F-9650-ED6DADE898C8}" type="datetimeFigureOut">
               <a:rPr lang="en-US" smtClean="0"/>
-              <a:t>11/30/19</a:t>
+              <a:t>8/12/20</a:t>
             </a:fld>
             <a:endParaRPr lang="en-US"/>
           </a:p>
@@ -12222,71 +12271,7 @@
           <a:p>
             <a:pPr algn="ctr"/>
             <a:r>
-              <a:rPr lang="en-US" sz="1600" dirty="0">
-                <a:solidFill>
-                  <a:schemeClr val="tx1">
-                    <a:lumMod val="85000"/>
-                    <a:lumOff val="15000"/>
-                  </a:schemeClr>
-                </a:solidFill>
-              </a:rPr>
-              <a:t>You should have the following programs and packages installed:</a:t>
-            </a:r>
-          </a:p>
-          <a:p>
-            <a:pPr algn="ctr"/>
-            <a:r>
-              <a:rPr lang="en-US" sz="1600" dirty="0">
-                <a:solidFill>
-                  <a:schemeClr val="tx1">
-                    <a:lumMod val="85000"/>
-                    <a:lumOff val="15000"/>
-                  </a:schemeClr>
-                </a:solidFill>
-              </a:rPr>
-              <a:t>Python and </a:t>
-            </a:r>
-            <a:r>
-              <a:rPr lang="en-US" sz="1600" dirty="0" err="1">
-                <a:solidFill>
-                  <a:schemeClr val="tx1">
-                    <a:lumMod val="85000"/>
-                    <a:lumOff val="15000"/>
-                  </a:schemeClr>
-                </a:solidFill>
-              </a:rPr>
-              <a:t>Jupyter</a:t>
-            </a:r>
-            <a:r>
-              <a:rPr lang="en-US" sz="1600" dirty="0">
-                <a:solidFill>
-                  <a:schemeClr val="tx1">
-                    <a:lumMod val="85000"/>
-                    <a:lumOff val="15000"/>
-                  </a:schemeClr>
-                </a:solidFill>
-              </a:rPr>
-              <a:t> (both included in Anaconda)</a:t>
-            </a:r>
-          </a:p>
-          <a:p>
-            <a:pPr algn="ctr"/>
-            <a:r>
-              <a:rPr lang="en-US" sz="1600" dirty="0">
-                <a:solidFill>
-                  <a:schemeClr val="tx1">
-                    <a:lumMod val="85000"/>
-                    <a:lumOff val="15000"/>
-                  </a:schemeClr>
-                </a:solidFill>
-              </a:rPr>
-              <a:t>Biopython - on the command line, use one of the following commands:</a:t>
-            </a:r>
-          </a:p>
-          <a:p>
-            <a:pPr algn="ctr"/>
-            <a:r>
-              <a:rPr lang="en-US" sz="1600" dirty="0" err="1">
+              <a:rPr lang="en-US" sz="2400" dirty="0">
                 <a:solidFill>
                   <a:schemeClr val="tx1">
                     <a:lumMod val="85000"/>
@@ -12295,10 +12280,13 @@
                 </a:solidFill>
                 <a:latin typeface="Andale Mono" panose="020B0509000000000004" pitchFamily="49" charset="0"/>
               </a:rPr>
-              <a:t>conda</a:t>
+              <a:t>This workshop will begin at </a:t>
             </a:r>
+          </a:p>
+          <a:p>
+            <a:pPr algn="ctr"/>
             <a:r>
-              <a:rPr lang="en-US" sz="1600" dirty="0">
+              <a:rPr lang="en-US" sz="2400" dirty="0">
                 <a:solidFill>
                   <a:schemeClr val="tx1">
                     <a:lumMod val="85000"/>
@@ -12307,102 +12295,7 @@
                 </a:solidFill>
                 <a:latin typeface="Andale Mono" panose="020B0509000000000004" pitchFamily="49" charset="0"/>
               </a:rPr>
-              <a:t> install -c </a:t>
-            </a:r>
-            <a:r>
-              <a:rPr lang="en-US" sz="1600" dirty="0" err="1">
-                <a:solidFill>
-                  <a:schemeClr val="tx1">
-                    <a:lumMod val="85000"/>
-                    <a:lumOff val="15000"/>
-                  </a:schemeClr>
-                </a:solidFill>
-                <a:latin typeface="Andale Mono" panose="020B0509000000000004" pitchFamily="49" charset="0"/>
-              </a:rPr>
-              <a:t>conda</a:t>
-            </a:r>
-            <a:r>
-              <a:rPr lang="en-US" sz="1600" dirty="0">
-                <a:solidFill>
-                  <a:schemeClr val="tx1">
-                    <a:lumMod val="85000"/>
-                    <a:lumOff val="15000"/>
-                  </a:schemeClr>
-                </a:solidFill>
-                <a:latin typeface="Andale Mono" panose="020B0509000000000004" pitchFamily="49" charset="0"/>
-              </a:rPr>
-              <a:t>-forge </a:t>
-            </a:r>
-            <a:r>
-              <a:rPr lang="en-US" sz="1600" dirty="0" err="1">
-                <a:solidFill>
-                  <a:schemeClr val="tx1">
-                    <a:lumMod val="85000"/>
-                    <a:lumOff val="15000"/>
-                  </a:schemeClr>
-                </a:solidFill>
-                <a:latin typeface="Andale Mono" panose="020B0509000000000004" pitchFamily="49" charset="0"/>
-              </a:rPr>
-              <a:t>biopython</a:t>
-            </a:r>
-            <a:endParaRPr lang="en-US" sz="1600" dirty="0">
-              <a:solidFill>
-                <a:schemeClr val="tx1">
-                  <a:lumMod val="85000"/>
-                  <a:lumOff val="15000"/>
-                </a:schemeClr>
-              </a:solidFill>
-              <a:latin typeface="Andale Mono" panose="020B0509000000000004" pitchFamily="49" charset="0"/>
-            </a:endParaRPr>
-          </a:p>
-          <a:p>
-            <a:pPr algn="ctr"/>
-            <a:r>
-              <a:rPr lang="en-US" sz="1600" dirty="0">
-                <a:solidFill>
-                  <a:schemeClr val="tx1">
-                    <a:lumMod val="85000"/>
-                    <a:lumOff val="15000"/>
-                  </a:schemeClr>
-                </a:solidFill>
-              </a:rPr>
-              <a:t>OR  </a:t>
-            </a:r>
-            <a:r>
-              <a:rPr lang="en-US" sz="1600" dirty="0">
-                <a:solidFill>
-                  <a:schemeClr val="tx1">
-                    <a:lumMod val="85000"/>
-                    <a:lumOff val="15000"/>
-                  </a:schemeClr>
-                </a:solidFill>
-                <a:latin typeface="Andale Mono" panose="020B0509000000000004" pitchFamily="49" charset="0"/>
-              </a:rPr>
-              <a:t>pip install </a:t>
-            </a:r>
-            <a:r>
-              <a:rPr lang="en-US" sz="1600" dirty="0" err="1">
-                <a:solidFill>
-                  <a:schemeClr val="tx1">
-                    <a:lumMod val="85000"/>
-                    <a:lumOff val="15000"/>
-                  </a:schemeClr>
-                </a:solidFill>
-                <a:latin typeface="Andale Mono" panose="020B0509000000000004" pitchFamily="49" charset="0"/>
-              </a:rPr>
-              <a:t>biopython</a:t>
-            </a:r>
-            <a:r>
-              <a:rPr lang="en-US" sz="1600" dirty="0">
-                <a:solidFill>
-                  <a:schemeClr val="tx1">
-                    <a:lumMod val="85000"/>
-                    <a:lumOff val="15000"/>
-                  </a:schemeClr>
-                </a:solidFill>
-                <a:latin typeface="Andale Mono" panose="020B0509000000000004" pitchFamily="49" charset="0"/>
-              </a:rPr>
-              <a:t> </a:t>
+              <a:t>1:02 pm Central</a:t>
             </a:r>
           </a:p>
         </p:txBody>
@@ -12712,7 +12605,7 @@
         </p:nvSpPr>
         <p:spPr>
           <a:xfrm>
-            <a:off x="2152390" y="2086383"/>
+            <a:off x="1472628" y="2032564"/>
             <a:ext cx="1396436" cy="1396436"/>
           </a:xfrm>
           <a:prstGeom prst="rect">
@@ -12771,7 +12664,7 @@
         </p:nvGrpSpPr>
         <p:grpSpPr>
           <a:xfrm>
-            <a:off x="1704551" y="3598369"/>
+            <a:off x="1024789" y="3544550"/>
             <a:ext cx="2349427" cy="718099"/>
             <a:chOff x="-374146" y="1918935"/>
             <a:chExt cx="2349427" cy="718099"/>
@@ -12896,7 +12789,7 @@
                 <a:defRPr b="1"/>
               </a:pPr>
               <a:r>
-                <a:rPr lang="en-US" sz="1400" kern="1200" dirty="0"/>
+                <a:rPr lang="en-US" kern="1200" dirty="0"/>
                 <a:t>“sequence data” can mean:</a:t>
               </a:r>
             </a:p>
@@ -12914,7 +12807,7 @@
                 <a:buNone/>
                 <a:defRPr b="1"/>
               </a:pPr>
-              <a:endParaRPr lang="en-US" sz="1400" dirty="0"/>
+              <a:endParaRPr lang="en-US" dirty="0"/>
             </a:p>
             <a:p>
               <a:pPr marL="0" lvl="0" indent="0" algn="ctr" defTabSz="622300">
@@ -12931,7 +12824,7 @@
                 <a:defRPr b="1"/>
               </a:pPr>
               <a:r>
-                <a:rPr lang="en-US" sz="1400" kern="1200" dirty="0"/>
+                <a:rPr lang="en-US" kern="1200" dirty="0"/>
                 <a:t>DNA</a:t>
               </a:r>
             </a:p>
@@ -12950,7 +12843,7 @@
                 <a:defRPr b="1"/>
               </a:pPr>
               <a:r>
-                <a:rPr lang="en-US" sz="1400" kern="1200" dirty="0"/>
+                <a:rPr lang="en-US" kern="1200" dirty="0"/>
                 <a:t>RNA</a:t>
               </a:r>
             </a:p>
@@ -12969,11 +12862,11 @@
                 <a:defRPr b="1"/>
               </a:pPr>
               <a:r>
-                <a:rPr lang="en-US" sz="1400" dirty="0"/>
+                <a:rPr lang="en-US" dirty="0"/>
                 <a:t>P</a:t>
               </a:r>
               <a:r>
-                <a:rPr lang="en-US" sz="1400" kern="1200" dirty="0"/>
+                <a:rPr lang="en-US" kern="1200" dirty="0"/>
                 <a:t>rotein</a:t>
               </a:r>
             </a:p>
@@ -12992,10 +12885,10 @@
                 <a:defRPr b="1"/>
               </a:pPr>
               <a:r>
-                <a:rPr lang="en-US" sz="1400" dirty="0"/>
+                <a:rPr lang="en-US" dirty="0"/>
                 <a:t>Multiple Sequence Alignments</a:t>
               </a:r>
-              <a:endParaRPr lang="en-US" sz="1400" kern="1200" dirty="0"/>
+              <a:endParaRPr lang="en-US" kern="1200" dirty="0"/>
             </a:p>
           </p:txBody>
         </p:sp>
@@ -13014,8 +12907,8 @@
         </p:nvSpPr>
         <p:spPr>
           <a:xfrm>
-            <a:off x="6989059" y="1968267"/>
-            <a:ext cx="1510523" cy="1510523"/>
+            <a:off x="7401244" y="1325333"/>
+            <a:ext cx="1150829" cy="1510523"/>
           </a:xfrm>
           <a:prstGeom prst="rect">
             <a:avLst/>
@@ -13081,8 +12974,8 @@
         </p:nvGrpSpPr>
         <p:grpSpPr>
           <a:xfrm>
-            <a:off x="6508804" y="3553204"/>
-            <a:ext cx="4315781" cy="716512"/>
+            <a:off x="6332616" y="2910270"/>
+            <a:ext cx="3288084" cy="716512"/>
             <a:chOff x="5186697" y="1886991"/>
             <a:chExt cx="4315781" cy="716512"/>
           </a:xfrm>
@@ -13192,7 +13085,7 @@
             </a:bodyPr>
             <a:lstStyle/>
             <a:p>
-              <a:pPr marL="0" lvl="0" indent="0" algn="l" defTabSz="622300">
+              <a:pPr marL="0" lvl="0" indent="0" algn="ctr" defTabSz="622300">
                 <a:lnSpc>
                   <a:spcPct val="90000"/>
                 </a:lnSpc>
@@ -13206,7 +13099,7 @@
                 <a:defRPr b="1"/>
               </a:pPr>
               <a:r>
-                <a:rPr lang="en-US" sz="1400" kern="1200" dirty="0"/>
+                <a:rPr lang="en-US" kern="1200" dirty="0"/>
                 <a:t>”working with” can mean:</a:t>
               </a:r>
             </a:p>
@@ -13227,8 +13120,8 @@
         </p:nvGrpSpPr>
         <p:grpSpPr>
           <a:xfrm>
-            <a:off x="5015646" y="3915341"/>
-            <a:ext cx="5537832" cy="2543511"/>
+            <a:off x="4357689" y="3272407"/>
+            <a:ext cx="7237938" cy="2543511"/>
             <a:chOff x="2587529" y="2334654"/>
             <a:chExt cx="4379427" cy="1328429"/>
           </a:xfrm>
@@ -13351,7 +13244,7 @@
                 <a:buNone/>
               </a:pPr>
               <a:r>
-                <a:rPr lang="en-US" sz="1400" kern="1200" dirty="0"/>
+                <a:rPr lang="en-US" kern="1200" dirty="0"/>
                 <a:t>Renaming sequences</a:t>
               </a:r>
             </a:p>
@@ -13369,7 +13262,7 @@
                 <a:buNone/>
               </a:pPr>
               <a:r>
-                <a:rPr lang="en-US" sz="1400" kern="1200" dirty="0"/>
+                <a:rPr lang="en-US" kern="1200" dirty="0"/>
                 <a:t>Filtering and removing certain sequences from a group of sequences</a:t>
               </a:r>
             </a:p>
@@ -13387,7 +13280,7 @@
                 <a:buNone/>
               </a:pPr>
               <a:r>
-                <a:rPr lang="en-US" sz="1400" kern="1200" dirty="0"/>
+                <a:rPr lang="en-US" kern="1200" dirty="0"/>
                 <a:t>Combining sequences</a:t>
               </a:r>
             </a:p>
@@ -13405,7 +13298,7 @@
                 <a:buNone/>
               </a:pPr>
               <a:r>
-                <a:rPr lang="en-US" sz="1400" kern="1200" dirty="0"/>
+                <a:rPr lang="en-US" kern="1200" dirty="0"/>
                 <a:t>Transforming sequences: reverse complement/transcription/translation</a:t>
               </a:r>
             </a:p>
@@ -13423,7 +13316,7 @@
                 <a:buNone/>
               </a:pPr>
               <a:r>
-                <a:rPr lang="en-US" sz="1400" kern="1200" dirty="0"/>
+                <a:rPr lang="en-US" kern="1200" dirty="0"/>
                 <a:t>Plotting sequence lengths</a:t>
               </a:r>
             </a:p>
@@ -13441,7 +13334,7 @@
                 <a:buNone/>
               </a:pPr>
               <a:r>
-                <a:rPr lang="en-US" sz="1400" kern="1200" dirty="0"/>
+                <a:rPr lang="en-US" kern="1200" dirty="0"/>
                 <a:t>Plotting GC content</a:t>
               </a:r>
             </a:p>
@@ -13459,7 +13352,7 @@
                 <a:buNone/>
               </a:pPr>
               <a:r>
-                <a:rPr lang="en-US" sz="1400" kern="1200" dirty="0"/>
+                <a:rPr lang="en-US" kern="1200" dirty="0"/>
                 <a:t>Converting between file formats</a:t>
               </a:r>
             </a:p>
@@ -13477,11 +13370,11 @@
                 <a:buNone/>
               </a:pPr>
               <a:r>
-                <a:rPr lang="en-US" sz="1400" kern="1200" dirty="0" err="1"/>
+                <a:rPr lang="en-US" kern="1200" dirty="0" err="1"/>
                 <a:t>BLASTing</a:t>
               </a:r>
               <a:r>
-                <a:rPr lang="en-US" sz="1400" kern="1200" dirty="0"/>
+                <a:rPr lang="en-US" kern="1200" dirty="0"/>
                 <a:t> sequences and parsing the results</a:t>
               </a:r>
             </a:p>
@@ -13748,8 +13641,8 @@
         </p:nvSpPr>
         <p:spPr>
           <a:xfrm>
-            <a:off x="4978918" y="1109145"/>
-            <a:ext cx="6341016" cy="4603900"/>
+            <a:off x="4978918" y="1442595"/>
+            <a:ext cx="6341016" cy="4270450"/>
           </a:xfrm>
         </p:spPr>
         <p:txBody>
@@ -13758,49 +13651,52 @@
           </a:bodyPr>
           <a:lstStyle/>
           <a:p>
+            <a:pPr marL="0" indent="0">
+              <a:buNone/>
+            </a:pPr>
             <a:r>
-              <a:rPr lang="en-US" dirty="0"/>
+              <a:rPr lang="en-US" sz="2400" dirty="0"/>
               <a:t>Why should you use Biopython instead?</a:t>
             </a:r>
           </a:p>
           <a:p>
             <a:pPr lvl="1"/>
             <a:r>
-              <a:rPr lang="en-US" dirty="0"/>
+              <a:rPr lang="en-US" sz="2000" dirty="0"/>
               <a:t>Have total customization</a:t>
             </a:r>
           </a:p>
           <a:p>
             <a:pPr lvl="1"/>
             <a:r>
-              <a:rPr lang="en-US" dirty="0"/>
+              <a:rPr lang="en-US" sz="2000" dirty="0"/>
               <a:t>Save a record of what you did in a script</a:t>
             </a:r>
           </a:p>
           <a:p>
             <a:pPr lvl="1"/>
             <a:r>
-              <a:rPr lang="en-US" dirty="0"/>
+              <a:rPr lang="en-US" sz="2000" dirty="0"/>
               <a:t>Automate your analyses – let the computer do the work</a:t>
             </a:r>
           </a:p>
           <a:p>
             <a:pPr lvl="1"/>
             <a:r>
-              <a:rPr lang="en-US" dirty="0"/>
+              <a:rPr lang="en-US" sz="2000" dirty="0"/>
               <a:t>Parallelization – run the same script on multiple genes or files</a:t>
             </a:r>
           </a:p>
           <a:p>
             <a:pPr lvl="1"/>
             <a:r>
-              <a:rPr lang="en-US" dirty="0"/>
+              <a:rPr lang="en-US" sz="2000" dirty="0"/>
               <a:t>Combine your scripts into pipelines</a:t>
             </a:r>
           </a:p>
           <a:p>
             <a:pPr lvl="1"/>
-            <a:endParaRPr lang="en-US" dirty="0"/>
+            <a:endParaRPr lang="en-US" sz="2000" dirty="0"/>
           </a:p>
         </p:txBody>
       </p:sp>
@@ -14131,14 +14027,14 @@
             <p:ph idx="1"/>
             <p:extLst>
               <p:ext uri="{D42A27DB-BD31-4B8C-83A1-F6EECF244321}">
-                <p14:modId xmlns:p14="http://schemas.microsoft.com/office/powerpoint/2010/main" val="3714579983"/>
+                <p14:modId xmlns:p14="http://schemas.microsoft.com/office/powerpoint/2010/main" val="2142145319"/>
               </p:ext>
             </p:extLst>
           </p:nvPr>
         </p:nvGraphicFramePr>
         <p:xfrm>
-          <a:off x="1286933" y="1948543"/>
-          <a:ext cx="9618133" cy="4093482"/>
+          <a:off x="1286933" y="1585912"/>
+          <a:ext cx="9618133" cy="4772025"/>
         </p:xfrm>
         <a:graphic>
           <a:graphicData uri="http://schemas.openxmlformats.org/drawingml/2006/diagram">
@@ -15275,13 +15171,22 @@
           </a:bodyPr>
           <a:lstStyle/>
           <a:p>
+            <a:pPr marL="0" indent="0">
+              <a:buNone/>
+            </a:pPr>
+            <a:r>
+              <a:rPr lang="en-US" dirty="0"/>
+              <a:t>Two options for this workshop:</a:t>
+            </a:r>
+          </a:p>
+          <a:p>
             <a:pPr>
               <a:buFont typeface="+mj-lt"/>
               <a:buAutoNum type="arabicPeriod"/>
             </a:pPr>
             <a:r>
               <a:rPr lang="en-US" dirty="0"/>
-              <a:t>Go to </a:t>
+              <a:t>On your own computer (must have Biopython installed): Go to </a:t>
             </a:r>
             <a:r>
               <a:rPr lang="en-US" dirty="0" err="1"/>
@@ -15297,7 +15202,15 @@
             </a:r>
             <a:r>
               <a:rPr lang="en-US" dirty="0"/>
-              <a:t>/Biopython</a:t>
+              <a:t>/Biopython. Click the green button that says Code. Select Download ZIP. Unzip the folder and move the folder someplace easy to find in your Documents or Desktop. Open up Jupyter Lab (or Jupyter Notebook) from Anaconda (or from the command line). Navigate to the Biopython folder. Open up </a:t>
+            </a:r>
+            <a:r>
+              <a:rPr lang="en-US" dirty="0" err="1"/>
+              <a:t>Biopython.ipynb</a:t>
+            </a:r>
+            <a:r>
+              <a:rPr lang="en-US" dirty="0"/>
+              <a:t>.</a:t>
             </a:r>
           </a:p>
           <a:p>
@@ -15307,79 +15220,35 @@
             </a:pPr>
             <a:r>
               <a:rPr lang="en-US" dirty="0"/>
-              <a:t>Click the green button that says Clone or download</a:t>
-            </a:r>
-          </a:p>
-          <a:p>
-            <a:pPr>
-              <a:buFont typeface="+mj-lt"/>
-              <a:buAutoNum type="arabicPeriod"/>
-            </a:pPr>
-            <a:r>
-              <a:rPr lang="en-US" dirty="0"/>
-              <a:t>Select Download ZIP</a:t>
-            </a:r>
-          </a:p>
-          <a:p>
-            <a:pPr>
-              <a:buFont typeface="+mj-lt"/>
-              <a:buAutoNum type="arabicPeriod"/>
-            </a:pPr>
-            <a:r>
-              <a:rPr lang="en-US" dirty="0"/>
-              <a:t>Unzip the folder (Macs will usually unzip the folder automatically) and move the folder someplace easy to find in your Documents or Desktop</a:t>
-            </a:r>
-          </a:p>
-          <a:p>
-            <a:pPr>
-              <a:buFont typeface="+mj-lt"/>
-              <a:buAutoNum type="arabicPeriod"/>
-            </a:pPr>
-            <a:r>
-              <a:rPr lang="en-US" dirty="0"/>
-              <a:t>Open up </a:t>
+              <a:t>To access the notebook online: Go to </a:t>
             </a:r>
             <a:r>
-              <a:rPr lang="en-US" dirty="0" err="1"/>
-              <a:t>Jupyter</a:t>
+              <a:rPr lang="en-US" u="sng" dirty="0">
+                <a:hlinkClick r:id="rId2" tooltip="http://colab.research.google.com/"/>
+              </a:rPr>
+              <a:t>colab.research.google.com</a:t>
             </a:r>
             <a:r>
               <a:rPr lang="en-US" dirty="0"/>
-              <a:t> Lab (or </a:t>
-            </a:r>
-            <a:r>
-              <a:rPr lang="en-US" dirty="0" err="1"/>
-              <a:t>Jupyter</a:t>
-            </a:r>
-            <a:r>
-              <a:rPr lang="en-US" dirty="0"/>
-              <a:t> Notebook) from Anaconda (or from the command line)</a:t>
-            </a:r>
-          </a:p>
-          <a:p>
-            <a:pPr>
-              <a:buFont typeface="+mj-lt"/>
-              <a:buAutoNum type="arabicPeriod"/>
-            </a:pPr>
-            <a:r>
-              <a:rPr lang="en-US" dirty="0"/>
-              <a:t>Navigate to the Biopython folder</a:t>
-            </a:r>
-          </a:p>
-          <a:p>
-            <a:pPr>
-              <a:buFont typeface="+mj-lt"/>
-              <a:buAutoNum type="arabicPeriod"/>
-            </a:pPr>
-            <a:r>
-              <a:rPr lang="en-US" dirty="0"/>
-              <a:t>Open up </a:t>
+              <a:t>, select GitHub, search for agithasnoname/Biopython. Select </a:t>
             </a:r>
             <a:r>
               <a:rPr lang="en-US" dirty="0" err="1"/>
               <a:t>Biopython.ipynb</a:t>
             </a:r>
-            <a:endParaRPr lang="en-US" dirty="0"/>
+            <a:r>
+              <a:rPr lang="en-US" dirty="0"/>
+              <a:t>.</a:t>
+            </a:r>
+          </a:p>
+          <a:p>
+            <a:pPr marL="0" indent="0">
+              <a:buNone/>
+            </a:pPr>
+            <a:r>
+              <a:rPr lang="en-US" dirty="0"/>
+              <a:t>If option 1 is giving you trouble, please use option 2.</a:t>
+            </a:r>
           </a:p>
           <a:p>
             <a:pPr marL="0" indent="0">
@@ -15480,6 +15349,366 @@
     <p:extLst>
       <p:ext uri="{BB962C8B-B14F-4D97-AF65-F5344CB8AC3E}">
         <p14:creationId xmlns:p14="http://schemas.microsoft.com/office/powerpoint/2010/main" val="3380937907"/>
+      </p:ext>
+    </p:extLst>
+  </p:cSld>
+  <p:clrMapOvr>
+    <a:masterClrMapping/>
+  </p:clrMapOvr>
+</p:sld>
+</file>
+
+<file path=ppt/slides/slide7.xml><?xml version="1.0" encoding="utf-8"?>
+<p:sld xmlns:a="http://schemas.openxmlformats.org/drawingml/2006/main" xmlns:r="http://schemas.openxmlformats.org/officeDocument/2006/relationships" xmlns:p="http://schemas.openxmlformats.org/presentationml/2006/main">
+  <p:cSld>
+    <p:bg>
+      <p:bgPr>
+        <a:solidFill>
+          <a:schemeClr val="bg1"/>
+        </a:solidFill>
+        <a:effectLst/>
+      </p:bgPr>
+    </p:bg>
+    <p:spTree>
+      <p:nvGrpSpPr>
+        <p:cNvPr id="1" name=""/>
+        <p:cNvGrpSpPr/>
+        <p:nvPr/>
+      </p:nvGrpSpPr>
+      <p:grpSpPr>
+        <a:xfrm>
+          <a:off x="0" y="0"/>
+          <a:ext cx="0" cy="0"/>
+          <a:chOff x="0" y="0"/>
+          <a:chExt cx="0" cy="0"/>
+        </a:xfrm>
+      </p:grpSpPr>
+      <p:sp useBgFill="1">
+        <p:nvSpPr>
+          <p:cNvPr id="30" name="Rectangle 7">
+            <a:extLst>
+              <a:ext uri="{FF2B5EF4-FFF2-40B4-BE49-F238E27FC236}">
+                <a16:creationId xmlns:a16="http://schemas.microsoft.com/office/drawing/2014/main" id="{603AE127-802C-459A-A612-DB85B67F0DC0}"/>
+              </a:ext>
+              <a:ext uri="{C183D7F6-B498-43B3-948B-1728B52AA6E4}">
+                <adec:decorative xmlns:adec="http://schemas.microsoft.com/office/drawing/2017/decorative" val="1"/>
+              </a:ext>
+            </a:extLst>
+          </p:cNvPr>
+          <p:cNvSpPr>
+            <a:spLocks noGrp="1" noRot="1" noChangeAspect="1" noMove="1" noResize="1" noEditPoints="1" noAdjustHandles="1" noChangeArrowheads="1" noChangeShapeType="1" noTextEdit="1"/>
+          </p:cNvSpPr>
+          <p:nvPr>
+            <p:extLst>
+              <p:ext uri="{386F3935-93C4-4BCD-93E2-E3B085C9AB24}">
+                <p16:designElem xmlns:p16="http://schemas.microsoft.com/office/powerpoint/2015/main" val="1"/>
+              </p:ext>
+            </p:extLst>
+          </p:nvPr>
+        </p:nvSpPr>
+        <p:spPr>
+          <a:xfrm>
+            <a:off x="0" y="0"/>
+            <a:ext cx="12192000" cy="6858000"/>
+          </a:xfrm>
+          <a:prstGeom prst="rect">
+            <a:avLst/>
+          </a:prstGeom>
+          <a:ln>
+            <a:noFill/>
+          </a:ln>
+        </p:spPr>
+        <p:style>
+          <a:lnRef idx="2">
+            <a:schemeClr val="accent1">
+              <a:shade val="50000"/>
+            </a:schemeClr>
+          </a:lnRef>
+          <a:fillRef idx="1">
+            <a:schemeClr val="accent1"/>
+          </a:fillRef>
+          <a:effectRef idx="0">
+            <a:schemeClr val="accent1"/>
+          </a:effectRef>
+          <a:fontRef idx="minor">
+            <a:schemeClr val="lt1"/>
+          </a:fontRef>
+        </p:style>
+        <p:txBody>
+          <a:bodyPr rtlCol="0" anchor="ctr"/>
+          <a:lstStyle/>
+          <a:p>
+            <a:pPr algn="ctr"/>
+            <a:endParaRPr lang="en-US"/>
+          </a:p>
+        </p:txBody>
+      </p:sp>
+      <p:sp>
+        <p:nvSpPr>
+          <p:cNvPr id="2" name="Title 1">
+            <a:extLst>
+              <a:ext uri="{FF2B5EF4-FFF2-40B4-BE49-F238E27FC236}">
+                <a16:creationId xmlns:a16="http://schemas.microsoft.com/office/drawing/2014/main" id="{4DDBFB52-67DD-6745-8659-0A5845BF3B73}"/>
+              </a:ext>
+            </a:extLst>
+          </p:cNvPr>
+          <p:cNvSpPr>
+            <a:spLocks noGrp="1"/>
+          </p:cNvSpPr>
+          <p:nvPr>
+            <p:ph type="title"/>
+          </p:nvPr>
+        </p:nvSpPr>
+        <p:spPr>
+          <a:xfrm>
+            <a:off x="1043950" y="1179151"/>
+            <a:ext cx="3300646" cy="4463889"/>
+          </a:xfrm>
+        </p:spPr>
+        <p:txBody>
+          <a:bodyPr anchor="ctr">
+            <a:normAutofit/>
+          </a:bodyPr>
+          <a:lstStyle/>
+          <a:p>
+            <a:r>
+              <a:rPr lang="en-US" dirty="0">
+                <a:solidFill>
+                  <a:schemeClr val="accent2">
+                    <a:lumMod val="75000"/>
+                  </a:schemeClr>
+                </a:solidFill>
+              </a:rPr>
+              <a:t>Workshop plan</a:t>
+            </a:r>
+          </a:p>
+        </p:txBody>
+      </p:sp>
+      <p:sp>
+        <p:nvSpPr>
+          <p:cNvPr id="31" name="Isosceles Triangle 9">
+            <a:extLst>
+              <a:ext uri="{FF2B5EF4-FFF2-40B4-BE49-F238E27FC236}">
+                <a16:creationId xmlns:a16="http://schemas.microsoft.com/office/drawing/2014/main" id="{9323D83D-50D6-4040-A58B-FCEA340F886A}"/>
+              </a:ext>
+              <a:ext uri="{C183D7F6-B498-43B3-948B-1728B52AA6E4}">
+                <adec:decorative xmlns:adec="http://schemas.microsoft.com/office/drawing/2017/decorative" val="1"/>
+              </a:ext>
+            </a:extLst>
+          </p:cNvPr>
+          <p:cNvSpPr>
+            <a:spLocks noGrp="1" noRot="1" noChangeAspect="1" noMove="1" noResize="1" noEditPoints="1" noAdjustHandles="1" noChangeArrowheads="1" noChangeShapeType="1" noTextEdit="1"/>
+          </p:cNvSpPr>
+          <p:nvPr>
+            <p:extLst>
+              <p:ext uri="{386F3935-93C4-4BCD-93E2-E3B085C9AB24}">
+                <p16:designElem xmlns:p16="http://schemas.microsoft.com/office/powerpoint/2015/main" val="1"/>
+              </p:ext>
+            </p:extLst>
+          </p:nvPr>
+        </p:nvSpPr>
+        <p:spPr>
+          <a:xfrm>
+            <a:off x="0" y="4013200"/>
+            <a:ext cx="448733" cy="2844800"/>
+          </a:xfrm>
+          <a:prstGeom prst="triangle">
+            <a:avLst>
+              <a:gd name="adj" fmla="val 0"/>
+            </a:avLst>
+          </a:prstGeom>
+          <a:solidFill>
+            <a:schemeClr val="accent1"/>
+          </a:solidFill>
+          <a:ln>
+            <a:noFill/>
+          </a:ln>
+          <a:effectLst/>
+        </p:spPr>
+        <p:style>
+          <a:lnRef idx="1">
+            <a:schemeClr val="accent1"/>
+          </a:lnRef>
+          <a:fillRef idx="3">
+            <a:schemeClr val="accent1"/>
+          </a:fillRef>
+          <a:effectRef idx="2">
+            <a:schemeClr val="accent1"/>
+          </a:effectRef>
+          <a:fontRef idx="minor">
+            <a:schemeClr val="lt1"/>
+          </a:fontRef>
+        </p:style>
+      </p:sp>
+      <p:cxnSp>
+        <p:nvCxnSpPr>
+          <p:cNvPr id="32" name="Straight Connector 11">
+            <a:extLst>
+              <a:ext uri="{FF2B5EF4-FFF2-40B4-BE49-F238E27FC236}">
+                <a16:creationId xmlns:a16="http://schemas.microsoft.com/office/drawing/2014/main" id="{1A1FE6BB-DFB2-4080-9B5E-076EF5DDE67B}"/>
+              </a:ext>
+              <a:ext uri="{C183D7F6-B498-43B3-948B-1728B52AA6E4}">
+                <adec:decorative xmlns:adec="http://schemas.microsoft.com/office/drawing/2017/decorative" val="1"/>
+              </a:ext>
+            </a:extLst>
+          </p:cNvPr>
+          <p:cNvCxnSpPr>
+            <a:cxnSpLocks noGrp="1" noRot="1" noChangeAspect="1" noMove="1" noResize="1" noEditPoints="1" noAdjustHandles="1" noChangeArrowheads="1" noChangeShapeType="1"/>
+          </p:cNvCxnSpPr>
+          <p:nvPr>
+            <p:extLst>
+              <p:ext uri="{386F3935-93C4-4BCD-93E2-E3B085C9AB24}">
+                <p16:designElem xmlns:p16="http://schemas.microsoft.com/office/powerpoint/2015/main" val="1"/>
+              </p:ext>
+            </p:extLst>
+          </p:nvPr>
+        </p:nvCxnSpPr>
+        <p:spPr>
+          <a:xfrm>
+            <a:off x="4656670" y="1442595"/>
+            <a:ext cx="0" cy="3937000"/>
+          </a:xfrm>
+          <a:prstGeom prst="line">
+            <a:avLst/>
+          </a:prstGeom>
+        </p:spPr>
+        <p:style>
+          <a:lnRef idx="1">
+            <a:schemeClr val="accent1"/>
+          </a:lnRef>
+          <a:fillRef idx="0">
+            <a:schemeClr val="accent1"/>
+          </a:fillRef>
+          <a:effectRef idx="0">
+            <a:schemeClr val="accent1"/>
+          </a:effectRef>
+          <a:fontRef idx="minor">
+            <a:schemeClr val="tx1"/>
+          </a:fontRef>
+        </p:style>
+      </p:cxnSp>
+      <p:sp>
+        <p:nvSpPr>
+          <p:cNvPr id="3" name="Content Placeholder 2">
+            <a:extLst>
+              <a:ext uri="{FF2B5EF4-FFF2-40B4-BE49-F238E27FC236}">
+                <a16:creationId xmlns:a16="http://schemas.microsoft.com/office/drawing/2014/main" id="{0FB5B767-F6DE-2341-B21D-C190DDE7FD84}"/>
+              </a:ext>
+            </a:extLst>
+          </p:cNvPr>
+          <p:cNvSpPr>
+            <a:spLocks noGrp="1"/>
+          </p:cNvSpPr>
+          <p:nvPr>
+            <p:ph idx="1"/>
+          </p:nvPr>
+        </p:nvSpPr>
+        <p:spPr>
+          <a:xfrm>
+            <a:off x="4978918" y="1442595"/>
+            <a:ext cx="6341016" cy="4270450"/>
+          </a:xfrm>
+        </p:spPr>
+        <p:txBody>
+          <a:bodyPr anchor="ctr">
+            <a:normAutofit/>
+          </a:bodyPr>
+          <a:lstStyle/>
+          <a:p>
+            <a:pPr lvl="1"/>
+            <a:r>
+              <a:rPr lang="en-US" sz="2000" dirty="0"/>
+              <a:t>Please ask questions in the Zoom chat and I will answer during exercises or breaks</a:t>
+            </a:r>
+          </a:p>
+          <a:p>
+            <a:pPr lvl="1"/>
+            <a:r>
+              <a:rPr lang="en-US" sz="2000" dirty="0"/>
+              <a:t>If my internet goes out at any point, that means everyone gets a 10-minute break</a:t>
+            </a:r>
+          </a:p>
+          <a:p>
+            <a:pPr lvl="1"/>
+            <a:r>
+              <a:rPr lang="en-US" sz="2000" dirty="0"/>
+              <a:t>Installation instructions and links to materials are in the email that went out</a:t>
+            </a:r>
+          </a:p>
+          <a:p>
+            <a:pPr lvl="1"/>
+            <a:r>
+              <a:rPr lang="en-US" sz="2000" dirty="0"/>
+              <a:t>If you have any trouble on your own computer, please switch to Google </a:t>
+            </a:r>
+            <a:r>
+              <a:rPr lang="en-US" sz="2000" dirty="0" err="1"/>
+              <a:t>Colab</a:t>
+            </a:r>
+            <a:endParaRPr lang="en-US" sz="2000" dirty="0"/>
+          </a:p>
+        </p:txBody>
+      </p:sp>
+      <p:sp>
+        <p:nvSpPr>
+          <p:cNvPr id="33" name="Isosceles Triangle 13">
+            <a:extLst>
+              <a:ext uri="{FF2B5EF4-FFF2-40B4-BE49-F238E27FC236}">
+                <a16:creationId xmlns:a16="http://schemas.microsoft.com/office/drawing/2014/main" id="{F10FD715-4DCE-4779-B634-EC78315EA213}"/>
+              </a:ext>
+              <a:ext uri="{C183D7F6-B498-43B3-948B-1728B52AA6E4}">
+                <adec:decorative xmlns:adec="http://schemas.microsoft.com/office/drawing/2017/decorative" val="1"/>
+              </a:ext>
+            </a:extLst>
+          </p:cNvPr>
+          <p:cNvSpPr>
+            <a:spLocks noGrp="1" noRot="1" noChangeAspect="1" noMove="1" noResize="1" noEditPoints="1" noAdjustHandles="1" noChangeArrowheads="1" noChangeShapeType="1" noTextEdit="1"/>
+          </p:cNvSpPr>
+          <p:nvPr>
+            <p:extLst>
+              <p:ext uri="{386F3935-93C4-4BCD-93E2-E3B085C9AB24}">
+                <p16:designElem xmlns:p16="http://schemas.microsoft.com/office/powerpoint/2015/main" val="1"/>
+              </p:ext>
+            </p:extLst>
+          </p:nvPr>
+        </p:nvSpPr>
+        <p:spPr>
+          <a:xfrm rot="10800000" flipH="1">
+            <a:off x="11364139" y="0"/>
+            <a:ext cx="842596" cy="4616289"/>
+          </a:xfrm>
+          <a:prstGeom prst="triangle">
+            <a:avLst>
+              <a:gd name="adj" fmla="val 100000"/>
+            </a:avLst>
+          </a:prstGeom>
+          <a:solidFill>
+            <a:schemeClr val="accent2"/>
+          </a:solidFill>
+          <a:ln>
+            <a:noFill/>
+          </a:ln>
+          <a:effectLst/>
+        </p:spPr>
+        <p:style>
+          <a:lnRef idx="1">
+            <a:schemeClr val="accent1"/>
+          </a:lnRef>
+          <a:fillRef idx="3">
+            <a:schemeClr val="accent1"/>
+          </a:fillRef>
+          <a:effectRef idx="2">
+            <a:schemeClr val="accent1"/>
+          </a:effectRef>
+          <a:fontRef idx="minor">
+            <a:schemeClr val="lt1"/>
+          </a:fontRef>
+        </p:style>
+      </p:sp>
+    </p:spTree>
+    <p:extLst>
+      <p:ext uri="{BB962C8B-B14F-4D97-AF65-F5344CB8AC3E}">
+        <p14:creationId xmlns:p14="http://schemas.microsoft.com/office/powerpoint/2010/main" val="773284787"/>
       </p:ext>
     </p:extLst>
   </p:cSld>

</xml_diff>